<commit_message>
Added slides on surgeon, copilot, admin, and editor
</commit_message>
<xml_diff>
--- a/homeworks/hw2/MythicalMan-month_SurgicalTeam.pptx
+++ b/homeworks/hw2/MythicalMan-month_SurgicalTeam.pptx
@@ -5,13 +5,14 @@
     <p:sldMasterId id="2147483660" r:id="rId1"/>
   </p:sldMasterIdLst>
   <p:notesMasterIdLst>
-    <p:notesMasterId r:id="rId6"/>
+    <p:notesMasterId r:id="rId7"/>
   </p:notesMasterIdLst>
   <p:sldIdLst>
     <p:sldId id="256" r:id="rId2"/>
     <p:sldId id="257" r:id="rId3"/>
     <p:sldId id="258" r:id="rId4"/>
     <p:sldId id="259" r:id="rId5"/>
+    <p:sldId id="260" r:id="rId6"/>
   </p:sldIdLst>
   <p:sldSz cx="9144000" cy="6858000" type="screen4x3"/>
   <p:notesSz cx="6858000" cy="9144000"/>
@@ -195,7 +196,7 @@
           <a:p>
             <a:fld id="{F342B94A-56A7-41F3-8C12-EA5E77BEF4C0}" type="datetimeFigureOut">
               <a:rPr lang="en-US" smtClean="0"/>
-              <a:t>6/18/2013</a:t>
+              <a:t>6/19/2013</a:t>
             </a:fld>
             <a:endParaRPr lang="en-US"/>
           </a:p>
@@ -363,6 +364,11 @@
         </p:txBody>
       </p:sp>
     </p:spTree>
+    <p:extLst>
+      <p:ext uri="{BB962C8B-B14F-4D97-AF65-F5344CB8AC3E}">
+        <p14:creationId xmlns:p14="http://schemas.microsoft.com/office/powerpoint/2010/main" val="885609477"/>
+      </p:ext>
+    </p:extLst>
   </p:cSld>
   <p:clrMap bg1="lt1" tx1="dk1" bg2="lt2" tx2="dk2" accent1="accent1" accent2="accent2" accent3="accent3" accent4="accent4" accent5="accent5" accent6="accent6" hlink="hlink" folHlink="folHlink"/>
   <p:notesStyle>
@@ -497,7 +503,7 @@
             <a:fld id="{8F6BCBE8-30B0-4476-8762-9236B142003A}" type="datetimeFigureOut">
               <a:rPr lang="en-US" smtClean="0"/>
               <a:pPr/>
-              <a:t>6/18/2013</a:t>
+              <a:t>6/19/2013</a:t>
             </a:fld>
             <a:endParaRPr lang="en-US" sz="1100" dirty="0">
               <a:solidFill>
@@ -1230,7 +1236,7 @@
             <a:fld id="{8F6BCBE8-30B0-4476-8762-9236B142003A}" type="datetimeFigureOut">
               <a:rPr lang="en-US" smtClean="0"/>
               <a:pPr/>
-              <a:t>6/18/2013</a:t>
+              <a:t>6/19/2013</a:t>
             </a:fld>
             <a:endParaRPr lang="en-US" sz="1100" dirty="0">
               <a:solidFill>
@@ -1431,7 +1437,7 @@
             <a:fld id="{8F6BCBE8-30B0-4476-8762-9236B142003A}" type="datetimeFigureOut">
               <a:rPr lang="en-US" smtClean="0"/>
               <a:pPr/>
-              <a:t>6/18/2013</a:t>
+              <a:t>6/19/2013</a:t>
             </a:fld>
             <a:endParaRPr lang="en-US" sz="1100" dirty="0">
               <a:solidFill>
@@ -1622,7 +1628,7 @@
             <a:fld id="{8F6BCBE8-30B0-4476-8762-9236B142003A}" type="datetimeFigureOut">
               <a:rPr lang="en-US" smtClean="0"/>
               <a:pPr/>
-              <a:t>6/18/2013</a:t>
+              <a:t>6/19/2013</a:t>
             </a:fld>
             <a:endParaRPr lang="en-US" sz="1100" dirty="0">
               <a:solidFill>
@@ -3121,7 +3127,7 @@
             <a:fld id="{8F6BCBE8-30B0-4476-8762-9236B142003A}" type="datetimeFigureOut">
               <a:rPr lang="en-US" smtClean="0"/>
               <a:pPr/>
-              <a:t>6/18/2013</a:t>
+              <a:t>6/19/2013</a:t>
             </a:fld>
             <a:endParaRPr lang="en-US" sz="1100" dirty="0">
               <a:solidFill>
@@ -3737,7 +3743,7 @@
             <a:fld id="{8F6BCBE8-30B0-4476-8762-9236B142003A}" type="datetimeFigureOut">
               <a:rPr lang="en-US" smtClean="0"/>
               <a:pPr/>
-              <a:t>6/18/2013</a:t>
+              <a:t>6/19/2013</a:t>
             </a:fld>
             <a:endParaRPr lang="en-US" sz="1100" dirty="0">
               <a:solidFill>
@@ -4190,7 +4196,7 @@
             <a:fld id="{8F6BCBE8-30B0-4476-8762-9236B142003A}" type="datetimeFigureOut">
               <a:rPr lang="en-US" smtClean="0"/>
               <a:pPr/>
-              <a:t>6/18/2013</a:t>
+              <a:t>6/19/2013</a:t>
             </a:fld>
             <a:endParaRPr lang="en-US" sz="1100" dirty="0">
               <a:solidFill>
@@ -4767,7 +4773,7 @@
             <a:fld id="{8F6BCBE8-30B0-4476-8762-9236B142003A}" type="datetimeFigureOut">
               <a:rPr lang="en-US" smtClean="0"/>
               <a:pPr/>
-              <a:t>6/18/2013</a:t>
+              <a:t>6/19/2013</a:t>
             </a:fld>
             <a:endParaRPr lang="en-US" sz="1100" dirty="0">
               <a:solidFill>
@@ -4879,7 +4885,7 @@
             <a:fld id="{8F6BCBE8-30B0-4476-8762-9236B142003A}" type="datetimeFigureOut">
               <a:rPr lang="en-US" smtClean="0"/>
               <a:pPr/>
-              <a:t>6/18/2013</a:t>
+              <a:t>6/19/2013</a:t>
             </a:fld>
             <a:endParaRPr lang="en-US" sz="1100" dirty="0">
               <a:solidFill>
@@ -5149,7 +5155,7 @@
             <a:fld id="{8F6BCBE8-30B0-4476-8762-9236B142003A}" type="datetimeFigureOut">
               <a:rPr lang="en-US" smtClean="0"/>
               <a:pPr/>
-              <a:t>6/18/2013</a:t>
+              <a:t>6/19/2013</a:t>
             </a:fld>
             <a:endParaRPr lang="en-US" sz="1100" dirty="0">
               <a:solidFill>
@@ -5886,7 +5892,7 @@
             <a:fld id="{8F6BCBE8-30B0-4476-8762-9236B142003A}" type="datetimeFigureOut">
               <a:rPr lang="en-US" smtClean="0"/>
               <a:pPr/>
-              <a:t>6/18/2013</a:t>
+              <a:t>6/19/2013</a:t>
             </a:fld>
             <a:endParaRPr lang="en-US" sz="1100" dirty="0">
               <a:solidFill>
@@ -6575,7 +6581,7 @@
             <a:fld id="{8F6BCBE8-30B0-4476-8762-9236B142003A}" type="datetimeFigureOut">
               <a:rPr lang="en-US" smtClean="0"/>
               <a:pPr/>
-              <a:t>6/18/2013</a:t>
+              <a:t>6/19/2013</a:t>
             </a:fld>
             <a:endParaRPr lang="en-US" sz="1100" dirty="0">
               <a:solidFill>
@@ -7041,7 +7047,6 @@
               <a:rPr lang="en-US" dirty="0" smtClean="0"/>
               <a:t>The Mythical Man-month</a:t>
             </a:r>
-            <a:endParaRPr lang="en-US" dirty="0" smtClean="0"/>
           </a:p>
         </p:txBody>
       </p:sp>
@@ -7194,7 +7199,11 @@
           <a:bodyPr/>
           <a:lstStyle/>
           <a:p>
-            <a:endParaRPr lang="en-US"/>
+            <a:r>
+              <a:rPr lang="en-US" dirty="0" smtClean="0"/>
+              <a:t>The Surgeon</a:t>
+            </a:r>
+            <a:endParaRPr lang="en-US" dirty="0"/>
           </a:p>
         </p:txBody>
       </p:sp>
@@ -7213,7 +7222,35 @@
           <a:bodyPr/>
           <a:lstStyle/>
           <a:p>
-            <a:endParaRPr lang="en-US"/>
+            <a:r>
+              <a:rPr lang="en-US" dirty="0" smtClean="0"/>
+              <a:t>Chief Programmer</a:t>
+            </a:r>
+          </a:p>
+          <a:p>
+            <a:pPr lvl="1"/>
+            <a:r>
+              <a:rPr lang="en-US" dirty="0" smtClean="0"/>
+              <a:t>Designs, codes and tests program</a:t>
+            </a:r>
+          </a:p>
+          <a:p>
+            <a:pPr lvl="1"/>
+            <a:r>
+              <a:rPr lang="en-US" dirty="0" smtClean="0"/>
+              <a:t>Writes documentation</a:t>
+            </a:r>
+          </a:p>
+          <a:p>
+            <a:pPr lvl="1"/>
+            <a:r>
+              <a:rPr lang="en-US" dirty="0" smtClean="0"/>
+              <a:t>Must have great talent, ten years experience and considerable systems and application knowledge</a:t>
+            </a:r>
+            <a:endParaRPr lang="en-US" dirty="0"/>
+          </a:p>
+          <a:p>
+            <a:endParaRPr lang="en-US" dirty="0"/>
           </a:p>
         </p:txBody>
       </p:sp>
@@ -7257,7 +7294,21 @@
           <a:bodyPr/>
           <a:lstStyle/>
           <a:p>
-            <a:endParaRPr lang="en-US"/>
+            <a:r>
+              <a:rPr lang="en-US" dirty="0" smtClean="0"/>
+              <a:t>The Copilot</a:t>
+            </a:r>
+            <a:br>
+              <a:rPr lang="en-US" dirty="0" smtClean="0"/>
+            </a:br>
+            <a:r>
+              <a:rPr lang="en-US" dirty="0"/>
+              <a:t/>
+            </a:r>
+            <a:br>
+              <a:rPr lang="en-US" dirty="0"/>
+            </a:br>
+            <a:endParaRPr lang="en-US" dirty="0"/>
           </a:p>
         </p:txBody>
       </p:sp>
@@ -7276,7 +7327,36 @@
           <a:bodyPr/>
           <a:lstStyle/>
           <a:p>
-            <a:endParaRPr lang="en-US"/>
+            <a:r>
+              <a:rPr lang="en-US" dirty="0" smtClean="0"/>
+              <a:t>Surgeon’s right hand  man</a:t>
+            </a:r>
+          </a:p>
+          <a:p>
+            <a:r>
+              <a:rPr lang="en-US" dirty="0" smtClean="0"/>
+              <a:t>Can do any part of the job, but is less experienced</a:t>
+            </a:r>
+          </a:p>
+          <a:p>
+            <a:pPr lvl="1"/>
+            <a:r>
+              <a:rPr lang="en-US" dirty="0" smtClean="0"/>
+              <a:t>May write code but is not responsible for any part of the code</a:t>
+            </a:r>
+            <a:endParaRPr lang="en-US" dirty="0"/>
+          </a:p>
+          <a:p>
+            <a:r>
+              <a:rPr lang="en-US" dirty="0" smtClean="0"/>
+              <a:t>Shares in design as a thinker, discussant, and evaluator</a:t>
+            </a:r>
+          </a:p>
+          <a:p>
+            <a:r>
+              <a:rPr lang="en-US" dirty="0" smtClean="0"/>
+              <a:t>Represents team in discussions of function and interface with other teams</a:t>
+            </a:r>
           </a:p>
         </p:txBody>
       </p:sp>
@@ -7320,7 +7400,11 @@
           <a:bodyPr/>
           <a:lstStyle/>
           <a:p>
-            <a:endParaRPr lang="en-US"/>
+            <a:r>
+              <a:rPr lang="en-US" dirty="0" smtClean="0"/>
+              <a:t>The Administrator</a:t>
+            </a:r>
+            <a:endParaRPr lang="en-US" dirty="0"/>
           </a:p>
         </p:txBody>
       </p:sp>
@@ -7339,11 +7423,131 @@
           <a:bodyPr/>
           <a:lstStyle/>
           <a:p>
-            <a:endParaRPr lang="en-US"/>
+            <a:r>
+              <a:rPr lang="en-US" dirty="0" smtClean="0"/>
+              <a:t>Handles money, people, space and machines</a:t>
+            </a:r>
+          </a:p>
+          <a:p>
+            <a:r>
+              <a:rPr lang="en-US" dirty="0" smtClean="0"/>
+              <a:t>Interfaces with administration of the rest of the organization</a:t>
+            </a:r>
+          </a:p>
+          <a:p>
+            <a:r>
+              <a:rPr lang="en-US" dirty="0" smtClean="0"/>
+              <a:t>The surgeon has the final say on personnel, raises, space and so on, but he must spend very little time on these things.</a:t>
+            </a:r>
+          </a:p>
+          <a:p>
+            <a:pPr lvl="1"/>
+            <a:r>
+              <a:rPr lang="en-US" dirty="0" smtClean="0"/>
+              <a:t>Administrator caries the burden for him</a:t>
+            </a:r>
+            <a:endParaRPr lang="en-US" dirty="0"/>
           </a:p>
         </p:txBody>
       </p:sp>
     </p:spTree>
+  </p:cSld>
+  <p:clrMapOvr>
+    <a:masterClrMapping/>
+  </p:clrMapOvr>
+</p:sld>
+</file>
+
+<file path=ppt/slides/slide5.xml><?xml version="1.0" encoding="utf-8"?>
+<p:sld xmlns:a="http://schemas.openxmlformats.org/drawingml/2006/main" xmlns:r="http://schemas.openxmlformats.org/officeDocument/2006/relationships" xmlns:p="http://schemas.openxmlformats.org/presentationml/2006/main">
+  <p:cSld>
+    <p:spTree>
+      <p:nvGrpSpPr>
+        <p:cNvPr id="1" name=""/>
+        <p:cNvGrpSpPr/>
+        <p:nvPr/>
+      </p:nvGrpSpPr>
+      <p:grpSpPr>
+        <a:xfrm>
+          <a:off x="0" y="0"/>
+          <a:ext cx="0" cy="0"/>
+          <a:chOff x="0" y="0"/>
+          <a:chExt cx="0" cy="0"/>
+        </a:xfrm>
+      </p:grpSpPr>
+      <p:sp>
+        <p:nvSpPr>
+          <p:cNvPr id="2" name="Title 1"/>
+          <p:cNvSpPr>
+            <a:spLocks noGrp="1"/>
+          </p:cNvSpPr>
+          <p:nvPr>
+            <p:ph type="title"/>
+          </p:nvPr>
+        </p:nvSpPr>
+        <p:spPr/>
+        <p:txBody>
+          <a:bodyPr/>
+          <a:lstStyle/>
+          <a:p>
+            <a:r>
+              <a:rPr lang="en-US" dirty="0" smtClean="0"/>
+              <a:t>The Editor</a:t>
+            </a:r>
+            <a:endParaRPr lang="en-US" dirty="0"/>
+          </a:p>
+        </p:txBody>
+      </p:sp>
+      <p:sp>
+        <p:nvSpPr>
+          <p:cNvPr id="3" name="Content Placeholder 2"/>
+          <p:cNvSpPr>
+            <a:spLocks noGrp="1"/>
+          </p:cNvSpPr>
+          <p:nvPr>
+            <p:ph idx="1"/>
+          </p:nvPr>
+        </p:nvSpPr>
+        <p:spPr/>
+        <p:txBody>
+          <a:bodyPr/>
+          <a:lstStyle/>
+          <a:p>
+            <a:r>
+              <a:rPr lang="en-US" dirty="0" smtClean="0"/>
+              <a:t>For maximum clarity, the surgeon must generate the documentation</a:t>
+            </a:r>
+          </a:p>
+          <a:p>
+            <a:r>
+              <a:rPr lang="en-US" dirty="0" smtClean="0"/>
+              <a:t>The surgeon then hands off the draft to the editor</a:t>
+            </a:r>
+          </a:p>
+          <a:p>
+            <a:pPr lvl="1"/>
+            <a:r>
+              <a:rPr lang="en-US" dirty="0" smtClean="0"/>
+              <a:t>The editor criticized it, rework it, and provide references </a:t>
+            </a:r>
+            <a:r>
+              <a:rPr lang="en-US" smtClean="0"/>
+              <a:t>and bibliography</a:t>
+            </a:r>
+            <a:endParaRPr lang="en-US" dirty="0" smtClean="0"/>
+          </a:p>
+          <a:p>
+            <a:pPr lvl="1"/>
+            <a:endParaRPr lang="en-US" dirty="0"/>
+          </a:p>
+        </p:txBody>
+      </p:sp>
+    </p:spTree>
+    <p:extLst>
+      <p:ext uri="{BB962C8B-B14F-4D97-AF65-F5344CB8AC3E}">
+        <p14:creationId xmlns:p14="http://schemas.microsoft.com/office/powerpoint/2010/main" val="2973953338"/>
+      </p:ext>
+    </p:extLst>
   </p:cSld>
   <p:clrMapOvr>
     <a:masterClrMapping/>

</xml_diff>